<commit_message>
Class tweaks, and update from validator check.
</commit_message>
<xml_diff>
--- a/slides/classseven/slides.pptx
+++ b/slides/classseven/slides.pptx
@@ -5,7 +5,7 @@
     <p:sldMasterId id="2147483660" r:id="rId1"/>
   </p:sldMasterIdLst>
   <p:notesMasterIdLst>
-    <p:notesMasterId r:id="rId20"/>
+    <p:notesMasterId r:id="rId21"/>
   </p:notesMasterIdLst>
   <p:sldIdLst>
     <p:sldId id="256" r:id="rId2"/>
@@ -19,13 +19,14 @@
     <p:sldId id="397" r:id="rId10"/>
     <p:sldId id="405" r:id="rId11"/>
     <p:sldId id="406" r:id="rId12"/>
-    <p:sldId id="399" r:id="rId13"/>
-    <p:sldId id="400" r:id="rId14"/>
-    <p:sldId id="401" r:id="rId15"/>
-    <p:sldId id="402" r:id="rId16"/>
-    <p:sldId id="403" r:id="rId17"/>
-    <p:sldId id="404" r:id="rId18"/>
-    <p:sldId id="267" r:id="rId19"/>
+    <p:sldId id="407" r:id="rId13"/>
+    <p:sldId id="399" r:id="rId14"/>
+    <p:sldId id="400" r:id="rId15"/>
+    <p:sldId id="401" r:id="rId16"/>
+    <p:sldId id="402" r:id="rId17"/>
+    <p:sldId id="403" r:id="rId18"/>
+    <p:sldId id="404" r:id="rId19"/>
+    <p:sldId id="267" r:id="rId20"/>
   </p:sldIdLst>
   <p:sldSz cx="9144000" cy="6858000" type="screen4x3"/>
   <p:notesSz cx="6858000" cy="9144000"/>
@@ -209,7 +210,7 @@
           <a:p>
             <a:fld id="{9B5D41C8-0A92-DD47-AB00-F0EFFD66679B}" type="datetimeFigureOut">
               <a:rPr lang="en-US" smtClean="0"/>
-              <a:t>10/22/11</a:t>
+              <a:t>10/25/11</a:t>
             </a:fld>
             <a:endParaRPr lang="en-US"/>
           </a:p>
@@ -914,7 +915,7 @@
           <a:p>
             <a:fld id="{F0AB357A-3C6D-9E43-AB07-807CDFEA83A0}" type="slidenum">
               <a:rPr lang="en-US" smtClean="0"/>
-              <a:t>18</a:t>
+              <a:t>19</a:t>
             </a:fld>
             <a:endParaRPr lang="en-US"/>
           </a:p>
@@ -1561,7 +1562,7 @@
             <a:fld id="{B7C3F878-F5E8-489B-AC8A-64F2A7E22C28}" type="datetimeFigureOut">
               <a:rPr lang="en-US" smtClean="0"/>
               <a:pPr/>
-              <a:t>10/22/11</a:t>
+              <a:t>10/25/11</a:t>
             </a:fld>
             <a:endParaRPr lang="en-US"/>
           </a:p>
@@ -1768,7 +1769,7 @@
             <a:fld id="{B7C3F878-F5E8-489B-AC8A-64F2A7E22C28}" type="datetimeFigureOut">
               <a:rPr lang="en-US" smtClean="0"/>
               <a:pPr/>
-              <a:t>10/22/11</a:t>
+              <a:t>10/25/11</a:t>
             </a:fld>
             <a:endParaRPr lang="en-US"/>
           </a:p>
@@ -1975,7 +1976,7 @@
             <a:fld id="{B7C3F878-F5E8-489B-AC8A-64F2A7E22C28}" type="datetimeFigureOut">
               <a:rPr lang="en-US" smtClean="0"/>
               <a:pPr/>
-              <a:t>10/22/11</a:t>
+              <a:t>10/25/11</a:t>
             </a:fld>
             <a:endParaRPr lang="en-US"/>
           </a:p>
@@ -2168,7 +2169,7 @@
             <a:fld id="{B7C3F878-F5E8-489B-AC8A-64F2A7E22C28}" type="datetimeFigureOut">
               <a:rPr lang="en-US" smtClean="0"/>
               <a:pPr/>
-              <a:t>10/22/11</a:t>
+              <a:t>10/25/11</a:t>
             </a:fld>
             <a:endParaRPr lang="en-US"/>
           </a:p>
@@ -2409,7 +2410,7 @@
             <a:fld id="{B7C3F878-F5E8-489B-AC8A-64F2A7E22C28}" type="datetimeFigureOut">
               <a:rPr lang="en-US" smtClean="0"/>
               <a:pPr/>
-              <a:t>10/22/11</a:t>
+              <a:t>10/25/11</a:t>
             </a:fld>
             <a:endParaRPr lang="en-US"/>
           </a:p>
@@ -2524,7 +2525,7 @@
             <a:fld id="{B7C3F878-F5E8-489B-AC8A-64F2A7E22C28}" type="datetimeFigureOut">
               <a:rPr lang="en-US" smtClean="0"/>
               <a:pPr/>
-              <a:t>10/22/11</a:t>
+              <a:t>10/25/11</a:t>
             </a:fld>
             <a:endParaRPr lang="en-US"/>
           </a:p>
@@ -2956,7 +2957,7 @@
             <a:fld id="{B7C3F878-F5E8-489B-AC8A-64F2A7E22C28}" type="datetimeFigureOut">
               <a:rPr lang="en-US" smtClean="0"/>
               <a:pPr/>
-              <a:t>10/22/11</a:t>
+              <a:t>10/25/11</a:t>
             </a:fld>
             <a:endParaRPr lang="en-US"/>
           </a:p>
@@ -3237,7 +3238,7 @@
             <a:fld id="{B7C3F878-F5E8-489B-AC8A-64F2A7E22C28}" type="datetimeFigureOut">
               <a:rPr lang="en-US" smtClean="0"/>
               <a:pPr/>
-              <a:t>10/22/11</a:t>
+              <a:t>10/25/11</a:t>
             </a:fld>
             <a:endParaRPr lang="en-US"/>
           </a:p>
@@ -3329,7 +3330,7 @@
             <a:fld id="{B7C3F878-F5E8-489B-AC8A-64F2A7E22C28}" type="datetimeFigureOut">
               <a:rPr lang="en-US" smtClean="0"/>
               <a:pPr/>
-              <a:t>10/22/11</a:t>
+              <a:t>10/25/11</a:t>
             </a:fld>
             <a:endParaRPr lang="en-US"/>
           </a:p>
@@ -4168,7 +4169,7 @@
             <a:fld id="{B7C3F878-F5E8-489B-AC8A-64F2A7E22C28}" type="datetimeFigureOut">
               <a:rPr lang="en-US" smtClean="0"/>
               <a:pPr/>
-              <a:t>10/22/11</a:t>
+              <a:t>10/25/11</a:t>
             </a:fld>
             <a:endParaRPr lang="en-US"/>
           </a:p>
@@ -5001,7 +5002,7 @@
             <a:fld id="{B7C3F878-F5E8-489B-AC8A-64F2A7E22C28}" type="datetimeFigureOut">
               <a:rPr lang="en-US" smtClean="0"/>
               <a:pPr/>
-              <a:t>10/22/11</a:t>
+              <a:t>10/25/11</a:t>
             </a:fld>
             <a:endParaRPr lang="en-US"/>
           </a:p>
@@ -5657,7 +5658,7 @@
             <a:fld id="{B7C3F878-F5E8-489B-AC8A-64F2A7E22C28}" type="datetimeFigureOut">
               <a:rPr lang="en-US" smtClean="0"/>
               <a:pPr/>
-              <a:t>10/22/11</a:t>
+              <a:t>10/25/11</a:t>
             </a:fld>
             <a:endParaRPr lang="en-US" dirty="0"/>
           </a:p>
@@ -6288,6 +6289,13 @@
   <p:clrMapOvr>
     <a:masterClrMapping/>
   </p:clrMapOvr>
+  <p:timing>
+    <p:tnLst>
+      <p:par>
+        <p:cTn xmlns:p14="http://schemas.microsoft.com/office/powerpoint/2010/main" id="1" dur="indefinite" restart="never" nodeType="tmRoot"/>
+      </p:par>
+    </p:tnLst>
+  </p:timing>
 </p:sld>
 </file>
 
@@ -6365,7 +6373,7 @@
           </a:p>
           <a:p>
             <a:r>
-              <a:rPr lang="en-US" dirty="0" err="1" smtClean="0">
+              <a:rPr lang="en-US" dirty="0" smtClean="0">
                 <a:hlinkClick r:id="rId4"/>
               </a:rPr>
               <a:t>ColorBox</a:t>
@@ -6402,6 +6410,13 @@
   <p:clrMapOvr>
     <a:masterClrMapping/>
   </p:clrMapOvr>
+  <p:timing>
+    <p:tnLst>
+      <p:par>
+        <p:cTn xmlns:p14="http://schemas.microsoft.com/office/powerpoint/2010/main" id="1" dur="indefinite" restart="never" nodeType="tmRoot"/>
+      </p:par>
+    </p:tnLst>
+  </p:timing>
 </p:sld>
 </file>
 
@@ -6439,7 +6454,7 @@
           <a:p>
             <a:r>
               <a:rPr lang="en-US" dirty="0" smtClean="0"/>
-              <a:t>The Chapter</a:t>
+              <a:t>Better CSS</a:t>
             </a:r>
             <a:endParaRPr lang="en-US" dirty="0"/>
           </a:p>
@@ -6460,20 +6475,60 @@
           <a:bodyPr/>
           <a:lstStyle/>
           <a:p>
-            <a:endParaRPr lang="en-US"/>
+            <a:r>
+              <a:rPr lang="en-US" dirty="0" smtClean="0"/>
+              <a:t>Combine rules into one </a:t>
+            </a:r>
+            <a:r>
+              <a:rPr lang="en-US" dirty="0" smtClean="0"/>
+              <a:t>line</a:t>
+            </a:r>
+          </a:p>
+          <a:p>
+            <a:r>
+              <a:rPr lang="en-US" dirty="0" smtClean="0"/>
+              <a:t>Use multiple selectors for the same rules</a:t>
+            </a:r>
+            <a:endParaRPr lang="en-US" dirty="0" smtClean="0"/>
+          </a:p>
+          <a:p>
+            <a:r>
+              <a:rPr lang="en-US" dirty="0" smtClean="0"/>
+              <a:t>Use the shortcuts: font, border, margin, padding, etc.</a:t>
+            </a:r>
+          </a:p>
+          <a:p>
+            <a:r>
+              <a:rPr lang="en-US" dirty="0" smtClean="0"/>
+              <a:t>Don't forget ;</a:t>
+            </a:r>
+          </a:p>
+          <a:p>
+            <a:r>
+              <a:rPr lang="en-US" dirty="0" smtClean="0"/>
+              <a:t>Use common classes to save time</a:t>
+            </a:r>
+            <a:endParaRPr lang="en-US" dirty="0"/>
           </a:p>
         </p:txBody>
       </p:sp>
     </p:spTree>
     <p:extLst>
       <p:ext uri="{BB962C8B-B14F-4D97-AF65-F5344CB8AC3E}">
-        <p14:creationId xmlns:p14="http://schemas.microsoft.com/office/powerpoint/2010/main" val="3633167769"/>
+        <p14:creationId xmlns:p14="http://schemas.microsoft.com/office/powerpoint/2010/main" val="2101040971"/>
       </p:ext>
     </p:extLst>
   </p:cSld>
   <p:clrMapOvr>
     <a:masterClrMapping/>
   </p:clrMapOvr>
+  <p:timing>
+    <p:tnLst>
+      <p:par>
+        <p:cTn xmlns:p14="http://schemas.microsoft.com/office/powerpoint/2010/main" id="1" dur="indefinite" restart="never" nodeType="tmRoot"/>
+      </p:par>
+    </p:tnLst>
+  </p:timing>
 </p:sld>
 </file>
 
@@ -6511,7 +6566,7 @@
           <a:p>
             <a:r>
               <a:rPr lang="en-US" dirty="0" smtClean="0"/>
-              <a:t>Audience</a:t>
+              <a:t>The Chapter</a:t>
             </a:r>
             <a:endParaRPr lang="en-US" dirty="0"/>
           </a:p>
@@ -6532,63 +6587,27 @@
           <a:bodyPr/>
           <a:lstStyle/>
           <a:p>
-            <a:r>
-              <a:rPr lang="en-US" dirty="0" smtClean="0"/>
-              <a:t>Design is about audience</a:t>
-            </a:r>
-          </a:p>
-          <a:p>
-            <a:r>
-              <a:rPr lang="en-US" dirty="0" smtClean="0"/>
-              <a:t>Knowing your users is step 1</a:t>
-            </a:r>
-          </a:p>
-          <a:p>
-            <a:r>
-              <a:rPr lang="en-US" dirty="0" smtClean="0"/>
-              <a:t>Decides layout and design choices</a:t>
-            </a:r>
-          </a:p>
-          <a:p>
-            <a:r>
-              <a:rPr lang="en-US" dirty="0" smtClean="0"/>
-              <a:t>Also decides technical choices</a:t>
-            </a:r>
-          </a:p>
-          <a:p>
-            <a:pPr lvl="1"/>
-            <a:r>
-              <a:rPr lang="en-US" dirty="0" smtClean="0"/>
-              <a:t>Which resolutions?</a:t>
-            </a:r>
-          </a:p>
-          <a:p>
-            <a:pPr lvl="1"/>
-            <a:r>
-              <a:rPr lang="en-US" dirty="0" smtClean="0"/>
-              <a:t>Which browsers?</a:t>
-            </a:r>
-          </a:p>
-          <a:p>
-            <a:pPr lvl="1"/>
-            <a:r>
-              <a:rPr lang="en-US" dirty="0" smtClean="0"/>
-              <a:t>Special concerns?</a:t>
-            </a:r>
-            <a:endParaRPr lang="en-US" dirty="0"/>
+            <a:endParaRPr lang="en-US"/>
           </a:p>
         </p:txBody>
       </p:sp>
     </p:spTree>
     <p:extLst>
       <p:ext uri="{BB962C8B-B14F-4D97-AF65-F5344CB8AC3E}">
-        <p14:creationId xmlns:p14="http://schemas.microsoft.com/office/powerpoint/2010/main" val="2386623675"/>
+        <p14:creationId xmlns:p14="http://schemas.microsoft.com/office/powerpoint/2010/main" val="3633167769"/>
       </p:ext>
     </p:extLst>
   </p:cSld>
   <p:clrMapOvr>
     <a:masterClrMapping/>
   </p:clrMapOvr>
+  <p:timing>
+    <p:tnLst>
+      <p:par>
+        <p:cTn xmlns:p14="http://schemas.microsoft.com/office/powerpoint/2010/main" id="1" dur="indefinite" restart="never" nodeType="tmRoot"/>
+      </p:par>
+    </p:tnLst>
+  </p:timing>
 </p:sld>
 </file>
 
@@ -6626,7 +6645,7 @@
           <a:p>
             <a:r>
               <a:rPr lang="en-US" dirty="0" smtClean="0"/>
-              <a:t>Personas</a:t>
+              <a:t>Audience</a:t>
             </a:r>
             <a:endParaRPr lang="en-US" dirty="0"/>
           </a:p>
@@ -6644,74 +6663,51 @@
         </p:nvSpPr>
         <p:spPr/>
         <p:txBody>
-          <a:bodyPr>
-            <a:normAutofit fontScale="92500" lnSpcReduction="20000"/>
-          </a:bodyPr>
-          <a:lstStyle/>
-          <a:p>
-            <a:r>
-              <a:rPr lang="en-US" dirty="0" smtClean="0"/>
-              <a:t>A fictional user who represents a group</a:t>
-            </a:r>
-          </a:p>
-          <a:p>
-            <a:r>
-              <a:rPr lang="en-US" dirty="0" smtClean="0"/>
-              <a:t>Details should reflect what matters to web design &amp; development:</a:t>
+          <a:bodyPr/>
+          <a:lstStyle/>
+          <a:p>
+            <a:r>
+              <a:rPr lang="en-US" dirty="0" smtClean="0"/>
+              <a:t>Design is about audience</a:t>
+            </a:r>
+          </a:p>
+          <a:p>
+            <a:r>
+              <a:rPr lang="en-US" dirty="0" smtClean="0"/>
+              <a:t>Knowing your users is step 1</a:t>
+            </a:r>
+          </a:p>
+          <a:p>
+            <a:r>
+              <a:rPr lang="en-US" dirty="0" smtClean="0"/>
+              <a:t>Decides layout and design choices</a:t>
+            </a:r>
+          </a:p>
+          <a:p>
+            <a:r>
+              <a:rPr lang="en-US" dirty="0" smtClean="0"/>
+              <a:t>Also decides technical choices</a:t>
             </a:r>
           </a:p>
           <a:p>
             <a:pPr lvl="1"/>
             <a:r>
               <a:rPr lang="en-US" dirty="0" smtClean="0"/>
-              <a:t>Name</a:t>
+              <a:t>Which resolutions?</a:t>
             </a:r>
           </a:p>
           <a:p>
             <a:pPr lvl="1"/>
             <a:r>
               <a:rPr lang="en-US" dirty="0" smtClean="0"/>
-              <a:t>Age</a:t>
+              <a:t>Which browsers?</a:t>
             </a:r>
           </a:p>
           <a:p>
             <a:pPr lvl="1"/>
             <a:r>
               <a:rPr lang="en-US" dirty="0" smtClean="0"/>
-              <a:t>Picture</a:t>
-            </a:r>
-          </a:p>
-          <a:p>
-            <a:pPr lvl="1"/>
-            <a:r>
-              <a:rPr lang="en-US" dirty="0" smtClean="0"/>
-              <a:t>Browser, operating system, resolution</a:t>
-            </a:r>
-          </a:p>
-          <a:p>
-            <a:pPr lvl="1"/>
-            <a:r>
-              <a:rPr lang="en-US" dirty="0" smtClean="0"/>
-              <a:t>Occupation</a:t>
-            </a:r>
-          </a:p>
-          <a:p>
-            <a:pPr lvl="1"/>
-            <a:r>
-              <a:rPr lang="en-US" dirty="0" smtClean="0"/>
-              <a:t>Background story</a:t>
-            </a:r>
-          </a:p>
-          <a:p>
-            <a:r>
-              <a:rPr lang="en-US" dirty="0" smtClean="0"/>
-              <a:t>Can have multiples</a:t>
-            </a:r>
-          </a:p>
-          <a:p>
-            <a:r>
-              <a:rPr lang="en-US" dirty="0" smtClean="0"/>
-              <a:t>Base off of real data</a:t>
+              <a:t>Special concerns?</a:t>
             </a:r>
             <a:endParaRPr lang="en-US" dirty="0"/>
           </a:p>
@@ -6720,13 +6716,20 @@
     </p:spTree>
     <p:extLst>
       <p:ext uri="{BB962C8B-B14F-4D97-AF65-F5344CB8AC3E}">
-        <p14:creationId xmlns:p14="http://schemas.microsoft.com/office/powerpoint/2010/main" val="98199237"/>
+        <p14:creationId xmlns:p14="http://schemas.microsoft.com/office/powerpoint/2010/main" val="2386623675"/>
       </p:ext>
     </p:extLst>
   </p:cSld>
   <p:clrMapOvr>
     <a:masterClrMapping/>
   </p:clrMapOvr>
+  <p:timing>
+    <p:tnLst>
+      <p:par>
+        <p:cTn xmlns:p14="http://schemas.microsoft.com/office/powerpoint/2010/main" id="1" dur="indefinite" restart="never" nodeType="tmRoot"/>
+      </p:par>
+    </p:tnLst>
+  </p:timing>
 </p:sld>
 </file>
 
@@ -6764,7 +6767,7 @@
           <a:p>
             <a:r>
               <a:rPr lang="en-US" dirty="0" smtClean="0"/>
-              <a:t>Persona Data</a:t>
+              <a:t>Personas</a:t>
             </a:r>
             <a:endParaRPr lang="en-US" dirty="0"/>
           </a:p>
@@ -6782,66 +6785,74 @@
         </p:nvSpPr>
         <p:spPr/>
         <p:txBody>
-          <a:bodyPr/>
-          <a:lstStyle/>
-          <a:p>
-            <a:r>
-              <a:rPr lang="en-US" dirty="0" smtClean="0"/>
-              <a:t>Existing sites</a:t>
+          <a:bodyPr>
+            <a:normAutofit fontScale="92500" lnSpcReduction="20000"/>
+          </a:bodyPr>
+          <a:lstStyle/>
+          <a:p>
+            <a:r>
+              <a:rPr lang="en-US" dirty="0" smtClean="0"/>
+              <a:t>A fictional user who represents a group</a:t>
+            </a:r>
+          </a:p>
+          <a:p>
+            <a:r>
+              <a:rPr lang="en-US" dirty="0" smtClean="0"/>
+              <a:t>Details should reflect what matters to web design &amp; development:</a:t>
             </a:r>
           </a:p>
           <a:p>
             <a:pPr lvl="1"/>
             <a:r>
               <a:rPr lang="en-US" dirty="0" smtClean="0"/>
-              <a:t>Server logs</a:t>
+              <a:t>Name</a:t>
             </a:r>
           </a:p>
           <a:p>
             <a:pPr lvl="1"/>
             <a:r>
-              <a:rPr lang="en-US" dirty="0" smtClean="0">
-                <a:hlinkClick r:id="rId2"/>
-              </a:rPr>
-              <a:t>Google Analytics</a:t>
-            </a:r>
-            <a:endParaRPr lang="en-US" dirty="0" smtClean="0"/>
+              <a:rPr lang="en-US" dirty="0" smtClean="0"/>
+              <a:t>Age</a:t>
+            </a:r>
           </a:p>
           <a:p>
             <a:pPr lvl="1"/>
             <a:r>
-              <a:rPr lang="en-US" dirty="0" err="1" smtClean="0">
-                <a:hlinkClick r:id="rId3"/>
-              </a:rPr>
-              <a:t>Quantcast</a:t>
-            </a:r>
-            <a:endParaRPr lang="en-US" dirty="0" smtClean="0"/>
-          </a:p>
-          <a:p>
-            <a:r>
-              <a:rPr lang="en-US" dirty="0" smtClean="0"/>
-              <a:t>New sites</a:t>
+              <a:rPr lang="en-US" dirty="0" smtClean="0"/>
+              <a:t>Picture</a:t>
             </a:r>
           </a:p>
           <a:p>
             <a:pPr lvl="1"/>
             <a:r>
               <a:rPr lang="en-US" dirty="0" smtClean="0"/>
-              <a:t>Surveys of physical customers</a:t>
+              <a:t>Browser, operating system, resolution</a:t>
             </a:r>
           </a:p>
           <a:p>
             <a:pPr lvl="1"/>
             <a:r>
               <a:rPr lang="en-US" dirty="0" smtClean="0"/>
-              <a:t>Study competitors</a:t>
+              <a:t>Occupation</a:t>
             </a:r>
           </a:p>
           <a:p>
             <a:pPr lvl="1"/>
             <a:r>
               <a:rPr lang="en-US" dirty="0" smtClean="0"/>
-              <a:t>Focus groups</a:t>
+              <a:t>Background story</a:t>
+            </a:r>
+          </a:p>
+          <a:p>
+            <a:r>
+              <a:rPr lang="en-US" dirty="0" smtClean="0"/>
+              <a:t>Can have multiples</a:t>
+            </a:r>
+          </a:p>
+          <a:p>
+            <a:r>
+              <a:rPr lang="en-US" dirty="0" smtClean="0"/>
+              <a:t>Base off of real data</a:t>
             </a:r>
             <a:endParaRPr lang="en-US" dirty="0"/>
           </a:p>
@@ -6850,7 +6861,7 @@
     </p:spTree>
     <p:extLst>
       <p:ext uri="{BB962C8B-B14F-4D97-AF65-F5344CB8AC3E}">
-        <p14:creationId xmlns:p14="http://schemas.microsoft.com/office/powerpoint/2010/main" val="3269068440"/>
+        <p14:creationId xmlns:p14="http://schemas.microsoft.com/office/powerpoint/2010/main" val="98199237"/>
       </p:ext>
     </p:extLst>
   </p:cSld>
@@ -6894,7 +6905,7 @@
           <a:p>
             <a:r>
               <a:rPr lang="en-US" dirty="0" smtClean="0"/>
-              <a:t>Screen Real Estate</a:t>
+              <a:t>Persona Data</a:t>
             </a:r>
             <a:endParaRPr lang="en-US" dirty="0"/>
           </a:p>
@@ -6916,60 +6927,71 @@
           <a:lstStyle/>
           <a:p>
             <a:r>
-              <a:rPr lang="en-US" dirty="0"/>
-              <a:t>Screen real estate is how much of </a:t>
-            </a:r>
-            <a:r>
-              <a:rPr lang="en-US" dirty="0" smtClean="0"/>
-              <a:t>your </a:t>
-            </a:r>
-            <a:r>
-              <a:rPr lang="en-US" dirty="0"/>
-              <a:t>site is </a:t>
-            </a:r>
-            <a:r>
-              <a:rPr lang="en-US" dirty="0" smtClean="0"/>
-              <a:t>visible is a browser</a:t>
-            </a:r>
-          </a:p>
-          <a:p>
-            <a:r>
-              <a:rPr lang="en-US" dirty="0" smtClean="0"/>
-              <a:t>One webpage, multiple resolutions</a:t>
-            </a:r>
-          </a:p>
-          <a:p>
-            <a:r>
-              <a:rPr lang="en-US" dirty="0" smtClean="0"/>
-              <a:t>Smaller resolution makes things look bigger</a:t>
-            </a:r>
-          </a:p>
-          <a:p>
-            <a:r>
-              <a:rPr lang="en-US" dirty="0" smtClean="0"/>
-              <a:t>Two main options:</a:t>
+              <a:rPr lang="en-US" dirty="0" smtClean="0"/>
+              <a:t>Existing sites</a:t>
             </a:r>
           </a:p>
           <a:p>
             <a:pPr lvl="1"/>
             <a:r>
               <a:rPr lang="en-US" dirty="0" smtClean="0"/>
-              <a:t>Use JavaScript to "hack" this</a:t>
+              <a:t>Server logs</a:t>
             </a:r>
           </a:p>
           <a:p>
             <a:pPr lvl="1"/>
             <a:r>
-              <a:rPr lang="en-US" dirty="0" smtClean="0"/>
-              <a:t>Design with resolutions in mind</a:t>
-            </a:r>
+              <a:rPr lang="en-US" dirty="0" smtClean="0">
+                <a:hlinkClick r:id="rId2"/>
+              </a:rPr>
+              <a:t>Google Analytics</a:t>
+            </a:r>
+            <a:endParaRPr lang="en-US" dirty="0" smtClean="0"/>
+          </a:p>
+          <a:p>
+            <a:pPr lvl="1"/>
+            <a:r>
+              <a:rPr lang="en-US" dirty="0" err="1" smtClean="0">
+                <a:hlinkClick r:id="rId3"/>
+              </a:rPr>
+              <a:t>Quantcast</a:t>
+            </a:r>
+            <a:endParaRPr lang="en-US" dirty="0" smtClean="0"/>
+          </a:p>
+          <a:p>
+            <a:r>
+              <a:rPr lang="en-US" dirty="0" smtClean="0"/>
+              <a:t>New sites</a:t>
+            </a:r>
+          </a:p>
+          <a:p>
+            <a:pPr lvl="1"/>
+            <a:r>
+              <a:rPr lang="en-US" dirty="0" smtClean="0"/>
+              <a:t>Surveys of physical customers</a:t>
+            </a:r>
+          </a:p>
+          <a:p>
+            <a:pPr lvl="1"/>
+            <a:r>
+              <a:rPr lang="en-US" dirty="0" smtClean="0"/>
+              <a:t>Study competitors</a:t>
+            </a:r>
+          </a:p>
+          <a:p>
+            <a:pPr lvl="1"/>
+            <a:r>
+              <a:rPr lang="en-US" dirty="0" smtClean="0"/>
+              <a:t>Focus groups</a:t>
+            </a:r>
+            <a:endParaRPr lang="en-US" dirty="0"/>
           </a:p>
         </p:txBody>
       </p:sp>
     </p:spTree>
     <p:extLst>
       <p:ext uri="{BB962C8B-B14F-4D97-AF65-F5344CB8AC3E}">
-        <p14:creationId xmlns:p14="http://schemas.microsoft.com/office/powerpoint/2010/main" val="441760661"/>
+        <p14:creationId xmlns:p14="http://schemas.microsoft.com/office/powerpoint/2010/main" val="3269068440"/>
       </p:ext>
     </p:extLst>
   </p:cSld>
@@ -7013,6 +7035,125 @@
           <a:p>
             <a:r>
               <a:rPr lang="en-US" dirty="0" smtClean="0"/>
+              <a:t>Screen Real Estate</a:t>
+            </a:r>
+            <a:endParaRPr lang="en-US" dirty="0"/>
+          </a:p>
+        </p:txBody>
+      </p:sp>
+      <p:sp>
+        <p:nvSpPr>
+          <p:cNvPr id="3" name="Content Placeholder 2"/>
+          <p:cNvSpPr>
+            <a:spLocks noGrp="1"/>
+          </p:cNvSpPr>
+          <p:nvPr>
+            <p:ph idx="1"/>
+          </p:nvPr>
+        </p:nvSpPr>
+        <p:spPr/>
+        <p:txBody>
+          <a:bodyPr/>
+          <a:lstStyle/>
+          <a:p>
+            <a:r>
+              <a:rPr lang="en-US" dirty="0"/>
+              <a:t>Screen real estate is how much of </a:t>
+            </a:r>
+            <a:r>
+              <a:rPr lang="en-US" dirty="0" smtClean="0"/>
+              <a:t>your </a:t>
+            </a:r>
+            <a:r>
+              <a:rPr lang="en-US" dirty="0"/>
+              <a:t>site is </a:t>
+            </a:r>
+            <a:r>
+              <a:rPr lang="en-US" dirty="0" smtClean="0"/>
+              <a:t>visible is a browser</a:t>
+            </a:r>
+          </a:p>
+          <a:p>
+            <a:r>
+              <a:rPr lang="en-US" dirty="0" smtClean="0"/>
+              <a:t>One webpage, multiple resolutions</a:t>
+            </a:r>
+          </a:p>
+          <a:p>
+            <a:r>
+              <a:rPr lang="en-US" dirty="0" smtClean="0"/>
+              <a:t>Smaller resolution makes things look bigger</a:t>
+            </a:r>
+          </a:p>
+          <a:p>
+            <a:r>
+              <a:rPr lang="en-US" dirty="0" smtClean="0"/>
+              <a:t>Two main options:</a:t>
+            </a:r>
+          </a:p>
+          <a:p>
+            <a:pPr lvl="1"/>
+            <a:r>
+              <a:rPr lang="en-US" dirty="0" smtClean="0"/>
+              <a:t>Use JavaScript to "hack" this</a:t>
+            </a:r>
+          </a:p>
+          <a:p>
+            <a:pPr lvl="1"/>
+            <a:r>
+              <a:rPr lang="en-US" dirty="0" smtClean="0"/>
+              <a:t>Design with resolutions in mind</a:t>
+            </a:r>
+          </a:p>
+        </p:txBody>
+      </p:sp>
+    </p:spTree>
+    <p:extLst>
+      <p:ext uri="{BB962C8B-B14F-4D97-AF65-F5344CB8AC3E}">
+        <p14:creationId xmlns:p14="http://schemas.microsoft.com/office/powerpoint/2010/main" val="441760661"/>
+      </p:ext>
+    </p:extLst>
+  </p:cSld>
+  <p:clrMapOvr>
+    <a:masterClrMapping/>
+  </p:clrMapOvr>
+</p:sld>
+</file>
+
+<file path=ppt/slides/slide18.xml><?xml version="1.0" encoding="utf-8"?>
+<p:sld xmlns:a="http://schemas.openxmlformats.org/drawingml/2006/main" xmlns:r="http://schemas.openxmlformats.org/officeDocument/2006/relationships" xmlns:p="http://schemas.openxmlformats.org/presentationml/2006/main">
+  <p:cSld>
+    <p:spTree>
+      <p:nvGrpSpPr>
+        <p:cNvPr id="1" name=""/>
+        <p:cNvGrpSpPr/>
+        <p:nvPr/>
+      </p:nvGrpSpPr>
+      <p:grpSpPr>
+        <a:xfrm>
+          <a:off x="0" y="0"/>
+          <a:ext cx="0" cy="0"/>
+          <a:chOff x="0" y="0"/>
+          <a:chExt cx="0" cy="0"/>
+        </a:xfrm>
+      </p:grpSpPr>
+      <p:sp>
+        <p:nvSpPr>
+          <p:cNvPr id="2" name="Title 1"/>
+          <p:cNvSpPr>
+            <a:spLocks noGrp="1"/>
+          </p:cNvSpPr>
+          <p:nvPr>
+            <p:ph type="title"/>
+          </p:nvPr>
+        </p:nvSpPr>
+        <p:spPr/>
+        <p:txBody>
+          <a:bodyPr/>
+          <a:lstStyle/>
+          <a:p>
+            <a:r>
+              <a:rPr lang="en-US" dirty="0" smtClean="0"/>
               <a:t>Example</a:t>
             </a:r>
             <a:endParaRPr lang="en-US" dirty="0"/>
@@ -7036,11 +7177,7 @@
           <a:p>
             <a:r>
               <a:rPr lang="en-US" dirty="0" smtClean="0"/>
-              <a:t>Let's change resolutions</a:t>
-            </a:r>
-            <a:r>
-              <a:rPr lang="en-US" dirty="0" smtClean="0"/>
-              <a:t>!</a:t>
+              <a:t>Let's change resolutions!</a:t>
             </a:r>
           </a:p>
           <a:p>
@@ -7076,7 +7213,7 @@
 </p:sld>
 </file>
 
-<file path=ppt/slides/slide18.xml><?xml version="1.0" encoding="utf-8"?>
+<file path=ppt/slides/slide19.xml><?xml version="1.0" encoding="utf-8"?>
 <p:sld xmlns:a="http://schemas.openxmlformats.org/drawingml/2006/main" xmlns:r="http://schemas.openxmlformats.org/officeDocument/2006/relationships" xmlns:p="http://schemas.openxmlformats.org/presentationml/2006/main">
   <p:cSld>
     <p:spTree>
@@ -7395,7 +7532,28 @@
           <a:p>
             <a:r>
               <a:rPr lang="en-US" dirty="0" smtClean="0"/>
-              <a:t>Fixed Class Six slides</a:t>
+              <a:t>Fixed Class Six </a:t>
+            </a:r>
+            <a:r>
+              <a:rPr lang="en-US" dirty="0" smtClean="0"/>
+              <a:t>slides</a:t>
+            </a:r>
+          </a:p>
+          <a:p>
+            <a:r>
+              <a:rPr lang="en-US" dirty="0"/>
+              <a:t>Midterms</a:t>
+            </a:r>
+            <a:r>
+              <a:rPr lang="en-US" dirty="0" smtClean="0"/>
+              <a:t>!</a:t>
+            </a:r>
+            <a:endParaRPr lang="en-US" dirty="0" smtClean="0"/>
+          </a:p>
+          <a:p>
+            <a:r>
+              <a:rPr lang="en-US" dirty="0" smtClean="0"/>
+              <a:t>There will be Class (next week)</a:t>
             </a:r>
           </a:p>
         </p:txBody>
@@ -7533,9 +7691,81 @@
         <p:spPr/>
         <p:txBody>
           <a:bodyPr>
-            <a:normAutofit/>
+            <a:normAutofit fontScale="92500"/>
           </a:bodyPr>
           <a:lstStyle/>
+          <a:p>
+            <a:r>
+              <a:rPr lang="en-US" dirty="0" smtClean="0">
+                <a:hlinkClick r:id="rId3"/>
+              </a:rPr>
+              <a:t>http://harrypotter.warnerbros.com/harrypotterandthedeathlyhallows/mainsite/dvd/</a:t>
+            </a:r>
+            <a:endParaRPr lang="en-US" dirty="0" smtClean="0"/>
+          </a:p>
+          <a:p>
+            <a:r>
+              <a:rPr lang="en-US" dirty="0" smtClean="0">
+                <a:hlinkClick r:id="rId4"/>
+              </a:rPr>
+              <a:t>http://www.olympic.org/</a:t>
+            </a:r>
+            <a:endParaRPr lang="en-US" dirty="0" smtClean="0"/>
+          </a:p>
+          <a:p>
+            <a:r>
+              <a:rPr lang="en-US" dirty="0" smtClean="0">
+                <a:hlinkClick r:id="rId5"/>
+              </a:rPr>
+              <a:t>http://pinterest.com/</a:t>
+            </a:r>
+            <a:endParaRPr lang="en-US" dirty="0" smtClean="0"/>
+          </a:p>
+          <a:p>
+            <a:r>
+              <a:rPr lang="en-US" dirty="0" smtClean="0">
+                <a:hlinkClick r:id="rId6"/>
+              </a:rPr>
+              <a:t>http://www.infinityart.ro</a:t>
+            </a:r>
+            <a:endParaRPr lang="en-US" dirty="0" smtClean="0"/>
+          </a:p>
+          <a:p>
+            <a:r>
+              <a:rPr lang="en-US" dirty="0" smtClean="0">
+                <a:hlinkClick r:id="rId7"/>
+              </a:rPr>
+              <a:t>http://www.metrolyrics.com/</a:t>
+            </a:r>
+            <a:endParaRPr lang="en-US" dirty="0" smtClean="0"/>
+          </a:p>
+          <a:p>
+            <a:r>
+              <a:rPr lang="en-US" dirty="0" smtClean="0">
+                <a:hlinkClick r:id="rId8"/>
+              </a:rPr>
+              <a:t>http://www.sporcle.com/</a:t>
+            </a:r>
+            <a:endParaRPr lang="en-US" dirty="0" smtClean="0"/>
+          </a:p>
+          <a:p>
+            <a:r>
+              <a:rPr lang="en-US" dirty="0" smtClean="0">
+                <a:hlinkClick r:id="rId9"/>
+              </a:rPr>
+              <a:t>http://www.clickrain.com/</a:t>
+            </a:r>
+            <a:endParaRPr lang="en-US" dirty="0" smtClean="0"/>
+          </a:p>
+          <a:p>
+            <a:r>
+              <a:rPr lang="en-US" dirty="0">
+                <a:hlinkClick r:id="rId10"/>
+              </a:rPr>
+              <a:t>http://lights.elliegoulding.com/</a:t>
+            </a:r>
+            <a:endParaRPr lang="en-US" dirty="0"/>
+          </a:p>
           <a:p>
             <a:endParaRPr lang="en-US" dirty="0"/>
           </a:p>
@@ -7920,11 +8150,7 @@
           <a:p>
             <a:r>
               <a:rPr lang="en-US" dirty="0" smtClean="0"/>
-              <a:t>Instead, you can use </a:t>
-            </a:r>
-            <a:r>
-              <a:rPr lang="en-US" dirty="0" smtClean="0"/>
-              <a:t>&amp;</a:t>
+              <a:t>Instead, you can use &amp;</a:t>
             </a:r>
             <a:r>
               <a:rPr lang="en-US" dirty="0" smtClean="0">
@@ -7940,7 +8166,6 @@
               <a:rPr lang="en-US" dirty="0" smtClean="0"/>
               <a:t>;</a:t>
             </a:r>
-            <a:endParaRPr lang="en-US" dirty="0" smtClean="0"/>
           </a:p>
           <a:p>
             <a:pPr lvl="1"/>
@@ -7976,11 +8201,7 @@
             <a:pPr lvl="1"/>
             <a:r>
               <a:rPr lang="en-US" dirty="0" smtClean="0"/>
-              <a:t>&amp;amp</a:t>
-            </a:r>
-            <a:r>
-              <a:rPr lang="en-US" dirty="0" smtClean="0"/>
-              <a:t>;</a:t>
+              <a:t>&amp;amp;</a:t>
             </a:r>
           </a:p>
           <a:p>
@@ -8010,6 +8231,13 @@
   <p:clrMapOvr>
     <a:masterClrMapping/>
   </p:clrMapOvr>
+  <p:timing>
+    <p:tnLst>
+      <p:par>
+        <p:cTn xmlns:p14="http://schemas.microsoft.com/office/powerpoint/2010/main" id="1" dur="indefinite" restart="never" nodeType="tmRoot"/>
+      </p:par>
+    </p:tnLst>
+  </p:timing>
 </p:sld>
 </file>
 

</xml_diff>